<commit_message>
Added 3rd presentation plus some examples of different programs.
</commit_message>
<xml_diff>
--- a/01-Version-Control-Systems.pptx
+++ b/01-Version-Control-Systems.pptx
@@ -296,7 +296,7 @@
           <a:p>
             <a:fld id="{3EA744D9-3FBE-48D8-BF2A-85DF203E4D20}" type="datetimeFigureOut">
               <a:rPr lang="bg-BG" smtClean="0"/>
-              <a:t>13.4.2015 г.</a:t>
+              <a:t>26.4.2015 г.</a:t>
             </a:fld>
             <a:endParaRPr lang="bg-BG"/>
           </a:p>
@@ -466,7 +466,7 @@
           <a:p>
             <a:fld id="{3EA744D9-3FBE-48D8-BF2A-85DF203E4D20}" type="datetimeFigureOut">
               <a:rPr lang="bg-BG" smtClean="0"/>
-              <a:t>13.4.2015 г.</a:t>
+              <a:t>26.4.2015 г.</a:t>
             </a:fld>
             <a:endParaRPr lang="bg-BG"/>
           </a:p>
@@ -646,7 +646,7 @@
           <a:p>
             <a:fld id="{3EA744D9-3FBE-48D8-BF2A-85DF203E4D20}" type="datetimeFigureOut">
               <a:rPr lang="bg-BG" smtClean="0"/>
-              <a:t>13.4.2015 г.</a:t>
+              <a:t>26.4.2015 г.</a:t>
             </a:fld>
             <a:endParaRPr lang="bg-BG"/>
           </a:p>
@@ -816,7 +816,7 @@
           <a:p>
             <a:fld id="{3EA744D9-3FBE-48D8-BF2A-85DF203E4D20}" type="datetimeFigureOut">
               <a:rPr lang="bg-BG" smtClean="0"/>
-              <a:t>13.4.2015 г.</a:t>
+              <a:t>26.4.2015 г.</a:t>
             </a:fld>
             <a:endParaRPr lang="bg-BG"/>
           </a:p>
@@ -1062,7 +1062,7 @@
           <a:p>
             <a:fld id="{3EA744D9-3FBE-48D8-BF2A-85DF203E4D20}" type="datetimeFigureOut">
               <a:rPr lang="bg-BG" smtClean="0"/>
-              <a:t>13.4.2015 г.</a:t>
+              <a:t>26.4.2015 г.</a:t>
             </a:fld>
             <a:endParaRPr lang="bg-BG"/>
           </a:p>
@@ -1350,7 +1350,7 @@
           <a:p>
             <a:fld id="{3EA744D9-3FBE-48D8-BF2A-85DF203E4D20}" type="datetimeFigureOut">
               <a:rPr lang="bg-BG" smtClean="0"/>
-              <a:t>13.4.2015 г.</a:t>
+              <a:t>26.4.2015 г.</a:t>
             </a:fld>
             <a:endParaRPr lang="bg-BG"/>
           </a:p>
@@ -1772,7 +1772,7 @@
           <a:p>
             <a:fld id="{3EA744D9-3FBE-48D8-BF2A-85DF203E4D20}" type="datetimeFigureOut">
               <a:rPr lang="bg-BG" smtClean="0"/>
-              <a:t>13.4.2015 г.</a:t>
+              <a:t>26.4.2015 г.</a:t>
             </a:fld>
             <a:endParaRPr lang="bg-BG"/>
           </a:p>
@@ -1890,7 +1890,7 @@
           <a:p>
             <a:fld id="{3EA744D9-3FBE-48D8-BF2A-85DF203E4D20}" type="datetimeFigureOut">
               <a:rPr lang="bg-BG" smtClean="0"/>
-              <a:t>13.4.2015 г.</a:t>
+              <a:t>26.4.2015 г.</a:t>
             </a:fld>
             <a:endParaRPr lang="bg-BG"/>
           </a:p>
@@ -1985,7 +1985,7 @@
           <a:p>
             <a:fld id="{3EA744D9-3FBE-48D8-BF2A-85DF203E4D20}" type="datetimeFigureOut">
               <a:rPr lang="bg-BG" smtClean="0"/>
-              <a:t>13.4.2015 г.</a:t>
+              <a:t>26.4.2015 г.</a:t>
             </a:fld>
             <a:endParaRPr lang="bg-BG"/>
           </a:p>
@@ -2262,7 +2262,7 @@
           <a:p>
             <a:fld id="{3EA744D9-3FBE-48D8-BF2A-85DF203E4D20}" type="datetimeFigureOut">
               <a:rPr lang="bg-BG" smtClean="0"/>
-              <a:t>13.4.2015 г.</a:t>
+              <a:t>26.4.2015 г.</a:t>
             </a:fld>
             <a:endParaRPr lang="bg-BG"/>
           </a:p>
@@ -2515,7 +2515,7 @@
           <a:p>
             <a:fld id="{3EA744D9-3FBE-48D8-BF2A-85DF203E4D20}" type="datetimeFigureOut">
               <a:rPr lang="bg-BG" smtClean="0"/>
-              <a:t>13.4.2015 г.</a:t>
+              <a:t>26.4.2015 г.</a:t>
             </a:fld>
             <a:endParaRPr lang="bg-BG"/>
           </a:p>
@@ -2737,7 +2737,7 @@
           <a:p>
             <a:fld id="{3EA744D9-3FBE-48D8-BF2A-85DF203E4D20}" type="datetimeFigureOut">
               <a:rPr lang="bg-BG" smtClean="0"/>
-              <a:t>13.4.2015 г.</a:t>
+              <a:t>26.4.2015 г.</a:t>
             </a:fld>
             <a:endParaRPr lang="bg-BG"/>
           </a:p>
@@ -3235,23 +3235,7 @@
                   <a:schemeClr val="accent6"/>
                 </a:solidFill>
               </a:rPr>
-              <a:t>Какво</a:t>
-            </a:r>
-            <a:r>
-              <a:rPr lang="bg-BG" dirty="0" smtClean="0">
-                <a:solidFill>
-                  <a:schemeClr val="accent6"/>
-                </a:solidFill>
-              </a:rPr>
-              <a:t> </a:t>
-            </a:r>
-            <a:r>
-              <a:rPr lang="bg-BG" dirty="0" smtClean="0">
-                <a:solidFill>
-                  <a:schemeClr val="accent6"/>
-                </a:solidFill>
-              </a:rPr>
-              <a:t>е </a:t>
+              <a:t>Какво е </a:t>
             </a:r>
             <a:r>
               <a:rPr lang="en-US" dirty="0" smtClean="0">
@@ -3358,27 +3342,7 @@
                   </a:schemeClr>
                 </a:solidFill>
               </a:rPr>
-              <a:t>Възможност за връщане към </a:t>
-            </a:r>
-            <a:r>
-              <a:rPr lang="bg-BG" dirty="0" smtClean="0">
-                <a:solidFill>
-                  <a:schemeClr val="bg1">
-                    <a:lumMod val="95000"/>
-                  </a:schemeClr>
-                </a:solidFill>
-              </a:rPr>
-              <a:t>по-стара </a:t>
-            </a:r>
-            <a:r>
-              <a:rPr lang="bg-BG" dirty="0" smtClean="0">
-                <a:solidFill>
-                  <a:schemeClr val="bg1">
-                    <a:lumMod val="95000"/>
-                  </a:schemeClr>
-                </a:solidFill>
-              </a:rPr>
-              <a:t>версия</a:t>
+              <a:t>Възможност за връщане към по-стара версия</a:t>
             </a:r>
           </a:p>
         </p:txBody>
@@ -3971,6 +3935,13 @@
   <p:clrMapOvr>
     <a:masterClrMapping/>
   </p:clrMapOvr>
+  <p:timing>
+    <p:tnLst>
+      <p:par>
+        <p:cTn id="1" dur="indefinite" restart="never" nodeType="tmRoot"/>
+      </p:par>
+    </p:tnLst>
+  </p:timing>
 </p:sld>
 </file>
 
@@ -4529,6 +4500,13 @@
   <p:clrMapOvr>
     <a:masterClrMapping/>
   </p:clrMapOvr>
+  <p:timing>
+    <p:tnLst>
+      <p:par>
+        <p:cTn id="1" dur="indefinite" restart="never" nodeType="tmRoot"/>
+      </p:par>
+    </p:tnLst>
+  </p:timing>
 </p:sld>
 </file>
 
@@ -4628,27 +4606,27 @@
                   </a:schemeClr>
                 </a:solidFill>
               </a:rPr>
-              <a:t>GIT repository </a:t>
-            </a:r>
-            <a:r>
-              <a:rPr lang="bg-BG" dirty="0" smtClean="0">
+              <a:t>GIT </a:t>
+            </a:r>
+            <a:r>
+              <a:rPr lang="en-US" dirty="0" smtClean="0">
                 <a:solidFill>
                   <a:schemeClr val="bg1">
                     <a:lumMod val="95000"/>
                   </a:schemeClr>
                 </a:solidFill>
               </a:rPr>
-              <a:t>и изпратете е-</a:t>
-            </a:r>
-            <a:r>
-              <a:rPr lang="en-US" dirty="0" smtClean="0">
+              <a:t>REPOSITORY </a:t>
+            </a:r>
+            <a:r>
+              <a:rPr lang="bg-BG" dirty="0" smtClean="0">
                 <a:solidFill>
                   <a:schemeClr val="bg1">
                     <a:lumMod val="95000"/>
                   </a:schemeClr>
                 </a:solidFill>
               </a:rPr>
-              <a:t>mail </a:t>
+              <a:t>и </a:t>
             </a:r>
             <a:r>
               <a:rPr lang="bg-BG" dirty="0" smtClean="0">
@@ -4658,7 +4636,7 @@
                   </a:schemeClr>
                 </a:solidFill>
               </a:rPr>
-              <a:t>до преподавателя с информация за вашето </a:t>
+              <a:t>изпратете е-</a:t>
             </a:r>
             <a:r>
               <a:rPr lang="en-US" dirty="0" smtClean="0">
@@ -4668,7 +4646,57 @@
                   </a:schemeClr>
                 </a:solidFill>
               </a:rPr>
-              <a:t>GIT repository</a:t>
+              <a:t>mail </a:t>
+            </a:r>
+            <a:r>
+              <a:rPr lang="bg-BG" dirty="0" smtClean="0">
+                <a:solidFill>
+                  <a:schemeClr val="bg1">
+                    <a:lumMod val="95000"/>
+                  </a:schemeClr>
+                </a:solidFill>
+              </a:rPr>
+              <a:t>до преподавателя с информация за вашето </a:t>
+            </a:r>
+            <a:r>
+              <a:rPr lang="en-US" dirty="0" smtClean="0">
+                <a:solidFill>
+                  <a:schemeClr val="bg1">
+                    <a:lumMod val="95000"/>
+                  </a:schemeClr>
+                </a:solidFill>
+              </a:rPr>
+              <a:t>GIT </a:t>
+            </a:r>
+            <a:r>
+              <a:rPr lang="en-US" dirty="0" smtClean="0">
+                <a:solidFill>
+                  <a:schemeClr val="bg1">
+                    <a:lumMod val="95000"/>
+                  </a:schemeClr>
+                </a:solidFill>
+              </a:rPr>
+              <a:t>REPOSITORY </a:t>
+            </a:r>
+            <a:r>
+              <a:rPr lang="bg-BG" dirty="0" smtClean="0">
+                <a:solidFill>
+                  <a:schemeClr val="bg1">
+                    <a:lumMod val="95000"/>
+                  </a:schemeClr>
+                </a:solidFill>
+              </a:rPr>
+              <a:t>или го поканете през сайта на </a:t>
+            </a:r>
+            <a:r>
+              <a:rPr lang="en-US" dirty="0" smtClean="0">
+                <a:solidFill>
+                  <a:schemeClr val="bg1">
+                    <a:lumMod val="95000"/>
+                  </a:schemeClr>
+                </a:solidFill>
+              </a:rPr>
+              <a:t>GitHub</a:t>
             </a:r>
             <a:endParaRPr lang="bg-BG" dirty="0">
               <a:solidFill>
@@ -4703,7 +4731,7 @@
 <file path=ppt/theme/theme1.xml><?xml version="1.0" encoding="utf-8"?>
 <a:theme xmlns:a="http://schemas.openxmlformats.org/drawingml/2006/main" name="Office Theme">
   <a:themeElements>
-    <a:clrScheme name="Office">
+    <a:clrScheme name="Custom 1">
       <a:dk1>
         <a:sysClr val="windowText" lastClr="000000"/>
       </a:dk1>
@@ -4735,10 +4763,10 @@
         <a:srgbClr val="F79646"/>
       </a:accent6>
       <a:hlink>
-        <a:srgbClr val="0000FF"/>
+        <a:srgbClr val="FFFF00"/>
       </a:hlink>
       <a:folHlink>
-        <a:srgbClr val="800080"/>
+        <a:srgbClr val="FF0000"/>
       </a:folHlink>
     </a:clrScheme>
     <a:fontScheme name="Office">

</xml_diff>